<commit_message>
OAuth2 and API token management and leasing
</commit_message>
<xml_diff>
--- a/IS - OAuth2/OAuth.pptx
+++ b/IS - OAuth2/OAuth.pptx
@@ -5,10 +5,10 @@
     <p:sldMasterId id="2147483660" r:id="rId1"/>
   </p:sldMasterIdLst>
   <p:notesMasterIdLst>
-    <p:notesMasterId r:id="rId26"/>
+    <p:notesMasterId r:id="rId27"/>
   </p:notesMasterIdLst>
   <p:handoutMasterIdLst>
-    <p:handoutMasterId r:id="rId27"/>
+    <p:handoutMasterId r:id="rId28"/>
   </p:handoutMasterIdLst>
   <p:sldIdLst>
     <p:sldId id="256" r:id="rId2"/>
@@ -21,20 +21,21 @@
     <p:sldId id="270" r:id="rId9"/>
     <p:sldId id="272" r:id="rId10"/>
     <p:sldId id="263" r:id="rId11"/>
-    <p:sldId id="259" r:id="rId12"/>
-    <p:sldId id="260" r:id="rId13"/>
-    <p:sldId id="261" r:id="rId14"/>
-    <p:sldId id="268" r:id="rId15"/>
-    <p:sldId id="278" r:id="rId16"/>
-    <p:sldId id="279" r:id="rId17"/>
-    <p:sldId id="280" r:id="rId18"/>
-    <p:sldId id="281" r:id="rId19"/>
-    <p:sldId id="283" r:id="rId20"/>
-    <p:sldId id="282" r:id="rId21"/>
-    <p:sldId id="284" r:id="rId22"/>
-    <p:sldId id="285" r:id="rId23"/>
-    <p:sldId id="277" r:id="rId24"/>
-    <p:sldId id="257" r:id="rId25"/>
+    <p:sldId id="286" r:id="rId12"/>
+    <p:sldId id="259" r:id="rId13"/>
+    <p:sldId id="260" r:id="rId14"/>
+    <p:sldId id="261" r:id="rId15"/>
+    <p:sldId id="268" r:id="rId16"/>
+    <p:sldId id="278" r:id="rId17"/>
+    <p:sldId id="279" r:id="rId18"/>
+    <p:sldId id="280" r:id="rId19"/>
+    <p:sldId id="281" r:id="rId20"/>
+    <p:sldId id="283" r:id="rId21"/>
+    <p:sldId id="282" r:id="rId22"/>
+    <p:sldId id="284" r:id="rId23"/>
+    <p:sldId id="285" r:id="rId24"/>
+    <p:sldId id="277" r:id="rId25"/>
+    <p:sldId id="257" r:id="rId26"/>
   </p:sldIdLst>
   <p:sldSz cx="9144000" cy="6858000" type="screen4x3"/>
   <p:notesSz cx="6858000" cy="9144000"/>
@@ -6043,7 +6044,7 @@
         <a:lstStyle/>
         <a:p>
           <a:r>
-            <a:rPr lang="en-US"/>
+            <a:rPr lang="en-US" dirty="0"/>
             <a:t>Username/password access - Resource Owner Password Credentials</a:t>
           </a:r>
         </a:p>
@@ -9486,7 +9487,7 @@
             <a:buNone/>
           </a:pPr>
           <a:r>
-            <a:rPr lang="en-US" sz="2100" kern="1200"/>
+            <a:rPr lang="en-US" sz="2100" kern="1200" dirty="0"/>
             <a:t>Username/password access - Resource Owner Password Credentials</a:t>
           </a:r>
         </a:p>
@@ -19547,7 +19548,7 @@
             <a:fld id="{9991DD79-C97D-5449-AA2F-3F0A2D9A4CA4}" type="slidenum">
               <a:rPr lang="en-US" altLang="en-US" smtClean="0"/>
               <a:pPr/>
-              <a:t>23</a:t>
+              <a:t>24</a:t>
             </a:fld>
             <a:endParaRPr lang="en-US" altLang="en-US"/>
           </a:p>
@@ -19696,7 +19697,7 @@
             <a:fld id="{104AA39B-C957-46A5-8838-6F2DECCF7FC3}" type="datetimeFigureOut">
               <a:rPr lang="en-US" smtClean="0"/>
               <a:pPr/>
-              <a:t>4/6/2021</a:t>
+              <a:t>5/2/2021</a:t>
             </a:fld>
             <a:endParaRPr lang="en-US"/>
           </a:p>
@@ -19880,7 +19881,7 @@
             <a:fld id="{104AA39B-C957-46A5-8838-6F2DECCF7FC3}" type="datetimeFigureOut">
               <a:rPr lang="en-US" smtClean="0"/>
               <a:pPr/>
-              <a:t>4/6/2021</a:t>
+              <a:t>5/2/2021</a:t>
             </a:fld>
             <a:endParaRPr lang="en-US"/>
           </a:p>
@@ -20074,7 +20075,7 @@
             <a:fld id="{104AA39B-C957-46A5-8838-6F2DECCF7FC3}" type="datetimeFigureOut">
               <a:rPr lang="en-US" smtClean="0"/>
               <a:pPr/>
-              <a:t>4/6/2021</a:t>
+              <a:t>5/2/2021</a:t>
             </a:fld>
             <a:endParaRPr lang="en-US"/>
           </a:p>
@@ -20258,7 +20259,7 @@
             <a:fld id="{104AA39B-C957-46A5-8838-6F2DECCF7FC3}" type="datetimeFigureOut">
               <a:rPr lang="en-US" smtClean="0"/>
               <a:pPr/>
-              <a:t>4/6/2021</a:t>
+              <a:t>5/2/2021</a:t>
             </a:fld>
             <a:endParaRPr lang="en-US"/>
           </a:p>
@@ -20465,7 +20466,7 @@
             <a:fld id="{104AA39B-C957-46A5-8838-6F2DECCF7FC3}" type="datetimeFigureOut">
               <a:rPr lang="en-US" smtClean="0"/>
               <a:pPr/>
-              <a:t>4/6/2021</a:t>
+              <a:t>5/2/2021</a:t>
             </a:fld>
             <a:endParaRPr lang="en-US"/>
           </a:p>
@@ -20766,7 +20767,7 @@
             <a:fld id="{104AA39B-C957-46A5-8838-6F2DECCF7FC3}" type="datetimeFigureOut">
               <a:rPr lang="en-US" smtClean="0"/>
               <a:pPr/>
-              <a:t>4/6/2021</a:t>
+              <a:t>5/2/2021</a:t>
             </a:fld>
             <a:endParaRPr lang="en-US"/>
           </a:p>
@@ -21206,7 +21207,7 @@
             <a:fld id="{104AA39B-C957-46A5-8838-6F2DECCF7FC3}" type="datetimeFigureOut">
               <a:rPr lang="en-US" smtClean="0"/>
               <a:pPr/>
-              <a:t>4/6/2021</a:t>
+              <a:t>5/2/2021</a:t>
             </a:fld>
             <a:endParaRPr lang="en-US"/>
           </a:p>
@@ -21339,7 +21340,7 @@
             <a:fld id="{104AA39B-C957-46A5-8838-6F2DECCF7FC3}" type="datetimeFigureOut">
               <a:rPr lang="en-US" smtClean="0"/>
               <a:pPr/>
-              <a:t>4/6/2021</a:t>
+              <a:t>5/2/2021</a:t>
             </a:fld>
             <a:endParaRPr lang="en-US"/>
           </a:p>
@@ -21450,7 +21451,7 @@
             <a:fld id="{104AA39B-C957-46A5-8838-6F2DECCF7FC3}" type="datetimeFigureOut">
               <a:rPr lang="en-US" smtClean="0"/>
               <a:pPr/>
-              <a:t>4/6/2021</a:t>
+              <a:t>5/2/2021</a:t>
             </a:fld>
             <a:endParaRPr lang="en-US"/>
           </a:p>
@@ -21741,7 +21742,7 @@
             <a:fld id="{104AA39B-C957-46A5-8838-6F2DECCF7FC3}" type="datetimeFigureOut">
               <a:rPr lang="en-US" smtClean="0"/>
               <a:pPr/>
-              <a:t>4/6/2021</a:t>
+              <a:t>5/2/2021</a:t>
             </a:fld>
             <a:endParaRPr lang="en-US"/>
           </a:p>
@@ -22013,7 +22014,7 @@
             <a:fld id="{104AA39B-C957-46A5-8838-6F2DECCF7FC3}" type="datetimeFigureOut">
               <a:rPr lang="en-US" smtClean="0"/>
               <a:pPr/>
-              <a:t>4/6/2021</a:t>
+              <a:t>5/2/2021</a:t>
             </a:fld>
             <a:endParaRPr lang="en-US"/>
           </a:p>
@@ -22224,7 +22225,7 @@
             <a:fld id="{104AA39B-C957-46A5-8838-6F2DECCF7FC3}" type="datetimeFigureOut">
               <a:rPr lang="en-US" smtClean="0"/>
               <a:pPr/>
-              <a:t>4/6/2021</a:t>
+              <a:t>5/2/2021</a:t>
             </a:fld>
             <a:endParaRPr lang="en-US"/>
           </a:p>
@@ -23231,6 +23232,74 @@
           <p:cNvPr id="2" name="Title 1">
             <a:extLst>
               <a:ext uri="{FF2B5EF4-FFF2-40B4-BE49-F238E27FC236}">
+                <a16:creationId xmlns:a16="http://schemas.microsoft.com/office/drawing/2014/main" id="{A84E5DF6-988C-438E-9D30-BDB84336B4F8}"/>
+              </a:ext>
+            </a:extLst>
+          </p:cNvPr>
+          <p:cNvSpPr>
+            <a:spLocks noGrp="1"/>
+          </p:cNvSpPr>
+          <p:nvPr>
+            <p:ph type="title"/>
+          </p:nvPr>
+        </p:nvSpPr>
+        <p:spPr>
+          <a:xfrm>
+            <a:off x="3276600" y="2819400"/>
+            <a:ext cx="3505200" cy="1666875"/>
+          </a:xfrm>
+        </p:spPr>
+        <p:txBody>
+          <a:bodyPr/>
+          <a:lstStyle/>
+          <a:p>
+            <a:r>
+              <a:rPr lang="en-US" dirty="0"/>
+              <a:t>oa</a:t>
+            </a:r>
+            <a:r>
+              <a:rPr lang="en-US" cap="none" dirty="0"/>
+              <a:t>uth2</a:t>
+            </a:r>
+            <a:endParaRPr lang="en-US" dirty="0"/>
+          </a:p>
+        </p:txBody>
+      </p:sp>
+    </p:spTree>
+    <p:extLst>
+      <p:ext uri="{BB962C8B-B14F-4D97-AF65-F5344CB8AC3E}">
+        <p14:creationId xmlns:p14="http://schemas.microsoft.com/office/powerpoint/2010/main" val="1960834357"/>
+      </p:ext>
+    </p:extLst>
+  </p:cSld>
+  <p:clrMapOvr>
+    <a:masterClrMapping/>
+  </p:clrMapOvr>
+</p:sld>
+</file>
+
+<file path=ppt/slides/slide12.xml><?xml version="1.0" encoding="utf-8"?>
+<p:sld xmlns:a="http://schemas.openxmlformats.org/drawingml/2006/main" xmlns:r="http://schemas.openxmlformats.org/officeDocument/2006/relationships" xmlns:p="http://schemas.openxmlformats.org/presentationml/2006/main">
+  <p:cSld>
+    <p:spTree>
+      <p:nvGrpSpPr>
+        <p:cNvPr id="1" name=""/>
+        <p:cNvGrpSpPr/>
+        <p:nvPr/>
+      </p:nvGrpSpPr>
+      <p:grpSpPr>
+        <a:xfrm>
+          <a:off x="0" y="0"/>
+          <a:ext cx="0" cy="0"/>
+          <a:chOff x="0" y="0"/>
+          <a:chExt cx="0" cy="0"/>
+        </a:xfrm>
+      </p:grpSpPr>
+      <p:sp>
+        <p:nvSpPr>
+          <p:cNvPr id="2" name="Title 1">
+            <a:extLst>
+              <a:ext uri="{FF2B5EF4-FFF2-40B4-BE49-F238E27FC236}">
                 <a16:creationId xmlns:a16="http://schemas.microsoft.com/office/drawing/2014/main" id="{B4455241-6FCB-4FF4-9FC6-36FF7E8B54E8}"/>
               </a:ext>
             </a:extLst>
@@ -23305,7 +23374,7 @@
 </p:sld>
 </file>
 
-<file path=ppt/slides/slide12.xml><?xml version="1.0" encoding="utf-8"?>
+<file path=ppt/slides/slide13.xml><?xml version="1.0" encoding="utf-8"?>
 <p:sld xmlns:a="http://schemas.openxmlformats.org/drawingml/2006/main" xmlns:r="http://schemas.openxmlformats.org/officeDocument/2006/relationships" xmlns:p="http://schemas.openxmlformats.org/presentationml/2006/main">
   <p:cSld>
     <p:spTree>
@@ -23424,7 +23493,7 @@
 </p:sld>
 </file>
 
-<file path=ppt/slides/slide13.xml><?xml version="1.0" encoding="utf-8"?>
+<file path=ppt/slides/slide14.xml><?xml version="1.0" encoding="utf-8"?>
 <p:sld xmlns:a="http://schemas.openxmlformats.org/drawingml/2006/main" xmlns:r="http://schemas.openxmlformats.org/officeDocument/2006/relationships" xmlns:p="http://schemas.openxmlformats.org/presentationml/2006/main">
   <p:cSld>
     <p:spTree>
@@ -23518,7 +23587,7 @@
 </p:sld>
 </file>
 
-<file path=ppt/slides/slide14.xml><?xml version="1.0" encoding="utf-8"?>
+<file path=ppt/slides/slide15.xml><?xml version="1.0" encoding="utf-8"?>
 <p:sld xmlns:a="http://schemas.openxmlformats.org/drawingml/2006/main" xmlns:r="http://schemas.openxmlformats.org/officeDocument/2006/relationships" xmlns:p="http://schemas.openxmlformats.org/presentationml/2006/main">
   <p:cSld>
     <p:spTree>
@@ -23659,7 +23728,7 @@
 </p:sld>
 </file>
 
-<file path=ppt/slides/slide15.xml><?xml version="1.0" encoding="utf-8"?>
+<file path=ppt/slides/slide16.xml><?xml version="1.0" encoding="utf-8"?>
 <p:sld xmlns:a="http://schemas.openxmlformats.org/drawingml/2006/main" xmlns:r="http://schemas.openxmlformats.org/officeDocument/2006/relationships" xmlns:p="http://schemas.openxmlformats.org/presentationml/2006/main">
   <p:cSld>
     <p:spTree>
@@ -23798,7 +23867,7 @@
 </p:sld>
 </file>
 
-<file path=ppt/slides/slide16.xml><?xml version="1.0" encoding="utf-8"?>
+<file path=ppt/slides/slide17.xml><?xml version="1.0" encoding="utf-8"?>
 <p:sld xmlns:a="http://schemas.openxmlformats.org/drawingml/2006/main" xmlns:r="http://schemas.openxmlformats.org/officeDocument/2006/relationships" xmlns:p="http://schemas.openxmlformats.org/presentationml/2006/main">
   <p:cSld>
     <p:spTree>
@@ -23885,7 +23954,7 @@
 </p:sld>
 </file>
 
-<file path=ppt/slides/slide17.xml><?xml version="1.0" encoding="utf-8"?>
+<file path=ppt/slides/slide18.xml><?xml version="1.0" encoding="utf-8"?>
 <p:sld xmlns:a="http://schemas.openxmlformats.org/drawingml/2006/main" xmlns:r="http://schemas.openxmlformats.org/officeDocument/2006/relationships" xmlns:p="http://schemas.openxmlformats.org/presentationml/2006/main">
   <p:cSld>
     <p:spTree>
@@ -24013,7 +24082,7 @@
 </p:sld>
 </file>
 
-<file path=ppt/slides/slide18.xml><?xml version="1.0" encoding="utf-8"?>
+<file path=ppt/slides/slide19.xml><?xml version="1.0" encoding="utf-8"?>
 <p:sld xmlns:a="http://schemas.openxmlformats.org/drawingml/2006/main" xmlns:r="http://schemas.openxmlformats.org/officeDocument/2006/relationships" xmlns:p="http://schemas.openxmlformats.org/presentationml/2006/main">
   <p:cSld>
     <p:spTree>
@@ -24146,93 +24215,6 @@
 </p:sld>
 </file>
 
-<file path=ppt/slides/slide19.xml><?xml version="1.0" encoding="utf-8"?>
-<p:sld xmlns:a="http://schemas.openxmlformats.org/drawingml/2006/main" xmlns:r="http://schemas.openxmlformats.org/officeDocument/2006/relationships" xmlns:p="http://schemas.openxmlformats.org/presentationml/2006/main">
-  <p:cSld>
-    <p:spTree>
-      <p:nvGrpSpPr>
-        <p:cNvPr id="1" name=""/>
-        <p:cNvGrpSpPr/>
-        <p:nvPr/>
-      </p:nvGrpSpPr>
-      <p:grpSpPr>
-        <a:xfrm>
-          <a:off x="0" y="0"/>
-          <a:ext cx="0" cy="0"/>
-          <a:chOff x="0" y="0"/>
-          <a:chExt cx="0" cy="0"/>
-        </a:xfrm>
-      </p:grpSpPr>
-      <p:sp>
-        <p:nvSpPr>
-          <p:cNvPr id="2" name="Title 1">
-            <a:extLst>
-              <a:ext uri="{FF2B5EF4-FFF2-40B4-BE49-F238E27FC236}">
-                <a16:creationId xmlns:a16="http://schemas.microsoft.com/office/drawing/2014/main" id="{17E2709A-8692-446B-86FC-BC1B9C0E8F1A}"/>
-              </a:ext>
-            </a:extLst>
-          </p:cNvPr>
-          <p:cNvSpPr>
-            <a:spLocks noGrp="1"/>
-          </p:cNvSpPr>
-          <p:nvPr>
-            <p:ph type="title"/>
-          </p:nvPr>
-        </p:nvSpPr>
-        <p:spPr/>
-        <p:txBody>
-          <a:bodyPr/>
-          <a:lstStyle/>
-          <a:p>
-            <a:r>
-              <a:rPr lang="en-US" dirty="0"/>
-              <a:t>Implicit</a:t>
-            </a:r>
-          </a:p>
-        </p:txBody>
-      </p:sp>
-      <p:pic>
-        <p:nvPicPr>
-          <p:cNvPr id="5" name="Content Placeholder 4" descr="A picture containing graphical user interface&#10;&#10;Description automatically generated">
-            <a:extLst>
-              <a:ext uri="{FF2B5EF4-FFF2-40B4-BE49-F238E27FC236}">
-                <a16:creationId xmlns:a16="http://schemas.microsoft.com/office/drawing/2014/main" id="{5394AB03-A312-4894-A8A2-995DB7284934}"/>
-              </a:ext>
-            </a:extLst>
-          </p:cNvPr>
-          <p:cNvPicPr>
-            <a:picLocks noGrp="1" noChangeAspect="1"/>
-          </p:cNvPicPr>
-          <p:nvPr>
-            <p:ph idx="1"/>
-          </p:nvPr>
-        </p:nvPicPr>
-        <p:blipFill>
-          <a:blip r:embed="rId2"/>
-          <a:stretch>
-            <a:fillRect/>
-          </a:stretch>
-        </p:blipFill>
-        <p:spPr>
-          <a:xfrm>
-            <a:off x="195558" y="1447800"/>
-            <a:ext cx="8752883" cy="4505325"/>
-          </a:xfrm>
-        </p:spPr>
-      </p:pic>
-    </p:spTree>
-    <p:extLst>
-      <p:ext uri="{BB962C8B-B14F-4D97-AF65-F5344CB8AC3E}">
-        <p14:creationId xmlns:p14="http://schemas.microsoft.com/office/powerpoint/2010/main" val="3921126706"/>
-      </p:ext>
-    </p:extLst>
-  </p:cSld>
-  <p:clrMapOvr>
-    <a:masterClrMapping/>
-  </p:clrMapOvr>
-</p:sld>
-</file>
-
 <file path=ppt/slides/slide2.xml><?xml version="1.0" encoding="utf-8"?>
 <p:sld xmlns:a="http://schemas.openxmlformats.org/drawingml/2006/main" xmlns:r="http://schemas.openxmlformats.org/officeDocument/2006/relationships" xmlns:p="http://schemas.openxmlformats.org/presentationml/2006/main">
   <p:cSld>
@@ -24332,6 +24314,93 @@
 </file>
 
 <file path=ppt/slides/slide20.xml><?xml version="1.0" encoding="utf-8"?>
+<p:sld xmlns:a="http://schemas.openxmlformats.org/drawingml/2006/main" xmlns:r="http://schemas.openxmlformats.org/officeDocument/2006/relationships" xmlns:p="http://schemas.openxmlformats.org/presentationml/2006/main">
+  <p:cSld>
+    <p:spTree>
+      <p:nvGrpSpPr>
+        <p:cNvPr id="1" name=""/>
+        <p:cNvGrpSpPr/>
+        <p:nvPr/>
+      </p:nvGrpSpPr>
+      <p:grpSpPr>
+        <a:xfrm>
+          <a:off x="0" y="0"/>
+          <a:ext cx="0" cy="0"/>
+          <a:chOff x="0" y="0"/>
+          <a:chExt cx="0" cy="0"/>
+        </a:xfrm>
+      </p:grpSpPr>
+      <p:sp>
+        <p:nvSpPr>
+          <p:cNvPr id="2" name="Title 1">
+            <a:extLst>
+              <a:ext uri="{FF2B5EF4-FFF2-40B4-BE49-F238E27FC236}">
+                <a16:creationId xmlns:a16="http://schemas.microsoft.com/office/drawing/2014/main" id="{17E2709A-8692-446B-86FC-BC1B9C0E8F1A}"/>
+              </a:ext>
+            </a:extLst>
+          </p:cNvPr>
+          <p:cNvSpPr>
+            <a:spLocks noGrp="1"/>
+          </p:cNvSpPr>
+          <p:nvPr>
+            <p:ph type="title"/>
+          </p:nvPr>
+        </p:nvSpPr>
+        <p:spPr/>
+        <p:txBody>
+          <a:bodyPr/>
+          <a:lstStyle/>
+          <a:p>
+            <a:r>
+              <a:rPr lang="en-US" dirty="0"/>
+              <a:t>Implicit</a:t>
+            </a:r>
+          </a:p>
+        </p:txBody>
+      </p:sp>
+      <p:pic>
+        <p:nvPicPr>
+          <p:cNvPr id="5" name="Content Placeholder 4" descr="A picture containing graphical user interface&#10;&#10;Description automatically generated">
+            <a:extLst>
+              <a:ext uri="{FF2B5EF4-FFF2-40B4-BE49-F238E27FC236}">
+                <a16:creationId xmlns:a16="http://schemas.microsoft.com/office/drawing/2014/main" id="{5394AB03-A312-4894-A8A2-995DB7284934}"/>
+              </a:ext>
+            </a:extLst>
+          </p:cNvPr>
+          <p:cNvPicPr>
+            <a:picLocks noGrp="1" noChangeAspect="1"/>
+          </p:cNvPicPr>
+          <p:nvPr>
+            <p:ph idx="1"/>
+          </p:nvPr>
+        </p:nvPicPr>
+        <p:blipFill>
+          <a:blip r:embed="rId2"/>
+          <a:stretch>
+            <a:fillRect/>
+          </a:stretch>
+        </p:blipFill>
+        <p:spPr>
+          <a:xfrm>
+            <a:off x="195558" y="1600200"/>
+            <a:ext cx="8752883" cy="4505325"/>
+          </a:xfrm>
+        </p:spPr>
+      </p:pic>
+    </p:spTree>
+    <p:extLst>
+      <p:ext uri="{BB962C8B-B14F-4D97-AF65-F5344CB8AC3E}">
+        <p14:creationId xmlns:p14="http://schemas.microsoft.com/office/powerpoint/2010/main" val="3921126706"/>
+      </p:ext>
+    </p:extLst>
+  </p:cSld>
+  <p:clrMapOvr>
+    <a:masterClrMapping/>
+  </p:clrMapOvr>
+</p:sld>
+</file>
+
+<file path=ppt/slides/slide21.xml><?xml version="1.0" encoding="utf-8"?>
 <p:sld xmlns:a="http://schemas.openxmlformats.org/drawingml/2006/main" xmlns:r="http://schemas.openxmlformats.org/officeDocument/2006/relationships" xmlns:p="http://schemas.openxmlformats.org/presentationml/2006/main">
   <p:cSld>
     <p:spTree>
@@ -24459,7 +24528,7 @@
 </p:sld>
 </file>
 
-<file path=ppt/slides/slide21.xml><?xml version="1.0" encoding="utf-8"?>
+<file path=ppt/slides/slide22.xml><?xml version="1.0" encoding="utf-8"?>
 <p:sld xmlns:a="http://schemas.openxmlformats.org/drawingml/2006/main" xmlns:r="http://schemas.openxmlformats.org/officeDocument/2006/relationships" xmlns:p="http://schemas.openxmlformats.org/presentationml/2006/main">
   <p:cSld>
     <p:spTree>
@@ -24546,7 +24615,7 @@
 </p:sld>
 </file>
 
-<file path=ppt/slides/slide22.xml><?xml version="1.0" encoding="utf-8"?>
+<file path=ppt/slides/slide23.xml><?xml version="1.0" encoding="utf-8"?>
 <p:sld xmlns:a="http://schemas.openxmlformats.org/drawingml/2006/main" xmlns:r="http://schemas.openxmlformats.org/officeDocument/2006/relationships" xmlns:p="http://schemas.openxmlformats.org/presentationml/2006/main">
   <p:cSld>
     <p:spTree>
@@ -24682,7 +24751,7 @@
 </p:sld>
 </file>
 
-<file path=ppt/slides/slide23.xml><?xml version="1.0" encoding="utf-8"?>
+<file path=ppt/slides/slide24.xml><?xml version="1.0" encoding="utf-8"?>
 <p:sld xmlns:a="http://schemas.openxmlformats.org/drawingml/2006/main" xmlns:r="http://schemas.openxmlformats.org/officeDocument/2006/relationships" xmlns:p="http://schemas.openxmlformats.org/presentationml/2006/main">
   <p:cSld>
     <p:spTree>
@@ -24778,7 +24847,7 @@
 </p:sld>
 </file>
 
-<file path=ppt/slides/slide24.xml><?xml version="1.0" encoding="utf-8"?>
+<file path=ppt/slides/slide25.xml><?xml version="1.0" encoding="utf-8"?>
 <p:sld xmlns:a="http://schemas.openxmlformats.org/drawingml/2006/main" xmlns:r="http://schemas.openxmlformats.org/officeDocument/2006/relationships" xmlns:p="http://schemas.openxmlformats.org/presentationml/2006/main">
   <p:cSld>
     <p:spTree>

</xml_diff>